<commit_message>
bundle definitions, schemas, domains, questions, examples
</commit_message>
<xml_diff>
--- a/docs/SCDs-and-Bundles.pptx
+++ b/docs/SCDs-and-Bundles.pptx
@@ -16,13 +16,14 @@
     <p:sldId id="340" r:id="rId10"/>
     <p:sldId id="315" r:id="rId11"/>
     <p:sldId id="342" r:id="rId12"/>
-    <p:sldId id="343" r:id="rId13"/>
-    <p:sldId id="344" r:id="rId14"/>
-    <p:sldId id="337" r:id="rId15"/>
-    <p:sldId id="338" r:id="rId16"/>
-    <p:sldId id="324" r:id="rId17"/>
-    <p:sldId id="327" r:id="rId18"/>
-    <p:sldId id="328" r:id="rId19"/>
+    <p:sldId id="345" r:id="rId13"/>
+    <p:sldId id="343" r:id="rId14"/>
+    <p:sldId id="344" r:id="rId15"/>
+    <p:sldId id="337" r:id="rId16"/>
+    <p:sldId id="338" r:id="rId17"/>
+    <p:sldId id="324" r:id="rId18"/>
+    <p:sldId id="327" r:id="rId19"/>
+    <p:sldId id="328" r:id="rId20"/>
   </p:sldIdLst>
   <p:sldSz cx="12192000" cy="6858000"/>
   <p:notesSz cx="6858000" cy="9144000"/>
@@ -285,7 +286,7 @@
             <a:fld id="{BAD35A94-27D5-F943-9E22-FF249660658B}" type="datetimeFigureOut">
               <a:rPr lang="en-US" smtClean="0"/>
               <a:pPr/>
-              <a:t>11/20/25</a:t>
+              <a:t>11/21/25</a:t>
             </a:fld>
             <a:endParaRPr lang="en-US"/>
           </a:p>
@@ -482,7 +483,7 @@
             <a:fld id="{BAD35A94-27D5-F943-9E22-FF249660658B}" type="datetimeFigureOut">
               <a:rPr lang="en-US" smtClean="0"/>
               <a:pPr/>
-              <a:t>11/20/25</a:t>
+              <a:t>11/21/25</a:t>
             </a:fld>
             <a:endParaRPr lang="en-US"/>
           </a:p>
@@ -689,7 +690,7 @@
             <a:fld id="{BAD35A94-27D5-F943-9E22-FF249660658B}" type="datetimeFigureOut">
               <a:rPr lang="en-US" smtClean="0"/>
               <a:pPr/>
-              <a:t>11/20/25</a:t>
+              <a:t>11/21/25</a:t>
             </a:fld>
             <a:endParaRPr lang="en-US"/>
           </a:p>
@@ -886,7 +887,7 @@
             <a:fld id="{BAD35A94-27D5-F943-9E22-FF249660658B}" type="datetimeFigureOut">
               <a:rPr lang="en-US" smtClean="0"/>
               <a:pPr/>
-              <a:t>11/20/25</a:t>
+              <a:t>11/21/25</a:t>
             </a:fld>
             <a:endParaRPr lang="en-US"/>
           </a:p>
@@ -1160,7 +1161,7 @@
             <a:fld id="{BAD35A94-27D5-F943-9E22-FF249660658B}" type="datetimeFigureOut">
               <a:rPr lang="en-US" smtClean="0"/>
               <a:pPr/>
-              <a:t>11/20/25</a:t>
+              <a:t>11/21/25</a:t>
             </a:fld>
             <a:endParaRPr lang="en-US"/>
           </a:p>
@@ -1424,7 +1425,7 @@
             <a:fld id="{BAD35A94-27D5-F943-9E22-FF249660658B}" type="datetimeFigureOut">
               <a:rPr lang="en-US" smtClean="0"/>
               <a:pPr/>
-              <a:t>11/20/25</a:t>
+              <a:t>11/21/25</a:t>
             </a:fld>
             <a:endParaRPr lang="en-US"/>
           </a:p>
@@ -1835,7 +1836,7 @@
             <a:fld id="{BAD35A94-27D5-F943-9E22-FF249660658B}" type="datetimeFigureOut">
               <a:rPr lang="en-US" smtClean="0"/>
               <a:pPr/>
-              <a:t>11/20/25</a:t>
+              <a:t>11/21/25</a:t>
             </a:fld>
             <a:endParaRPr lang="en-US"/>
           </a:p>
@@ -1975,7 +1976,7 @@
             <a:fld id="{BAD35A94-27D5-F943-9E22-FF249660658B}" type="datetimeFigureOut">
               <a:rPr lang="en-US" smtClean="0"/>
               <a:pPr/>
-              <a:t>11/20/25</a:t>
+              <a:t>11/21/25</a:t>
             </a:fld>
             <a:endParaRPr lang="en-US"/>
           </a:p>
@@ -2087,7 +2088,7 @@
             <a:fld id="{BAD35A94-27D5-F943-9E22-FF249660658B}" type="datetimeFigureOut">
               <a:rPr lang="en-US" smtClean="0"/>
               <a:pPr/>
-              <a:t>11/20/25</a:t>
+              <a:t>11/21/25</a:t>
             </a:fld>
             <a:endParaRPr lang="en-US"/>
           </a:p>
@@ -2397,7 +2398,7 @@
             <a:fld id="{BAD35A94-27D5-F943-9E22-FF249660658B}" type="datetimeFigureOut">
               <a:rPr lang="en-US" smtClean="0"/>
               <a:pPr/>
-              <a:t>11/20/25</a:t>
+              <a:t>11/21/25</a:t>
             </a:fld>
             <a:endParaRPr lang="en-US"/>
           </a:p>
@@ -2684,7 +2685,7 @@
             <a:fld id="{BAD35A94-27D5-F943-9E22-FF249660658B}" type="datetimeFigureOut">
               <a:rPr lang="en-US" smtClean="0"/>
               <a:pPr/>
-              <a:t>11/20/25</a:t>
+              <a:t>11/21/25</a:t>
             </a:fld>
             <a:endParaRPr lang="en-US"/>
           </a:p>
@@ -2910,7 +2911,7 @@
           <a:p>
             <a:fld id="{BAD35A94-27D5-F943-9E22-FF249660658B}" type="datetimeFigureOut">
               <a:rPr lang="en-US" smtClean="0"/>
-              <a:t>11/20/25</a:t>
+              <a:t>11/21/25</a:t>
             </a:fld>
             <a:endParaRPr lang="en-US"/>
           </a:p>
@@ -3978,66 +3979,1380 @@
       </p:grpSpPr>
       <p:sp>
         <p:nvSpPr>
-          <p:cNvPr id="2" name="Title 1">
-            <a:extLst>
-              <a:ext uri="{FF2B5EF4-FFF2-40B4-BE49-F238E27FC236}">
-                <a16:creationId xmlns:a16="http://schemas.microsoft.com/office/drawing/2014/main" id="{AFAE9414-A5E1-1614-2C74-C3CA2CFDD46C}"/>
-              </a:ext>
-            </a:extLst>
-          </p:cNvPr>
-          <p:cNvSpPr>
-            <a:spLocks noGrp="1"/>
-          </p:cNvSpPr>
-          <p:nvPr>
-            <p:ph type="title"/>
-          </p:nvPr>
-        </p:nvSpPr>
-        <p:spPr/>
-        <p:txBody>
-          <a:bodyPr/>
-          <a:lstStyle/>
-          <a:p>
-            <a:r>
-              <a:rPr lang="en-US" dirty="0"/>
-              <a:t>SCDs for Projects</a:t>
-            </a:r>
-          </a:p>
-        </p:txBody>
-      </p:sp>
-      <p:pic>
-        <p:nvPicPr>
-          <p:cNvPr id="7" name="Picture 6">
-            <a:extLst>
-              <a:ext uri="{FF2B5EF4-FFF2-40B4-BE49-F238E27FC236}">
-                <a16:creationId xmlns:a16="http://schemas.microsoft.com/office/drawing/2014/main" id="{8A2DD0A5-3C6A-7994-69DD-C7F154267AF4}"/>
-              </a:ext>
-            </a:extLst>
-          </p:cNvPr>
-          <p:cNvPicPr>
-            <a:picLocks noChangeAspect="1"/>
-          </p:cNvPicPr>
+          <p:cNvPr id="2" name="Rectangle 1">
+            <a:extLst>
+              <a:ext uri="{FF2B5EF4-FFF2-40B4-BE49-F238E27FC236}">
+                <a16:creationId xmlns:a16="http://schemas.microsoft.com/office/drawing/2014/main" id="{CAD322B3-C2B5-8FF9-D217-D912BB09B919}"/>
+              </a:ext>
+            </a:extLst>
+          </p:cNvPr>
+          <p:cNvSpPr/>
           <p:nvPr/>
-        </p:nvPicPr>
-        <p:blipFill>
-          <a:blip r:embed="rId2"/>
-          <a:stretch>
-            <a:fillRect/>
-          </a:stretch>
-        </p:blipFill>
-        <p:spPr>
-          <a:xfrm>
-            <a:off x="838200" y="1690688"/>
-            <a:ext cx="10320460" cy="4042665"/>
+        </p:nvSpPr>
+        <p:spPr>
+          <a:xfrm>
+            <a:off x="3331597" y="389614"/>
+            <a:ext cx="3387255" cy="5176299"/>
           </a:xfrm>
           <a:prstGeom prst="rect">
             <a:avLst/>
           </a:prstGeom>
         </p:spPr>
-      </p:pic>
+        <p:style>
+          <a:lnRef idx="2">
+            <a:schemeClr val="accent6"/>
+          </a:lnRef>
+          <a:fillRef idx="1">
+            <a:schemeClr val="lt1"/>
+          </a:fillRef>
+          <a:effectRef idx="0">
+            <a:schemeClr val="accent6"/>
+          </a:effectRef>
+          <a:fontRef idx="minor">
+            <a:schemeClr val="dk1"/>
+          </a:fontRef>
+        </p:style>
+        <p:txBody>
+          <a:bodyPr rtlCol="0" anchor="ctr"/>
+          <a:lstStyle/>
+          <a:p>
+            <a:pPr algn="ctr"/>
+            <a:endParaRPr lang="en-US"/>
+          </a:p>
+        </p:txBody>
+      </p:sp>
+      <p:sp>
+        <p:nvSpPr>
+          <p:cNvPr id="3" name="Rectangle 2">
+            <a:extLst>
+              <a:ext uri="{FF2B5EF4-FFF2-40B4-BE49-F238E27FC236}">
+                <a16:creationId xmlns:a16="http://schemas.microsoft.com/office/drawing/2014/main" id="{5EDB44FF-0AFE-5CD8-99F0-17ADC83E6D0F}"/>
+              </a:ext>
+            </a:extLst>
+          </p:cNvPr>
+          <p:cNvSpPr/>
+          <p:nvPr/>
+        </p:nvSpPr>
+        <p:spPr>
+          <a:xfrm>
+            <a:off x="3991551" y="1485033"/>
+            <a:ext cx="1969273" cy="531407"/>
+          </a:xfrm>
+          <a:prstGeom prst="rect">
+            <a:avLst/>
+          </a:prstGeom>
+        </p:spPr>
+        <p:style>
+          <a:lnRef idx="2">
+            <a:schemeClr val="accent2"/>
+          </a:lnRef>
+          <a:fillRef idx="1">
+            <a:schemeClr val="lt1"/>
+          </a:fillRef>
+          <a:effectRef idx="0">
+            <a:schemeClr val="accent2"/>
+          </a:effectRef>
+          <a:fontRef idx="minor">
+            <a:schemeClr val="dk1"/>
+          </a:fontRef>
+        </p:style>
+        <p:txBody>
+          <a:bodyPr rtlCol="0" anchor="ctr"/>
+          <a:lstStyle/>
+          <a:p>
+            <a:pPr algn="ctr"/>
+            <a:endParaRPr lang="en-US" dirty="0"/>
+          </a:p>
+        </p:txBody>
+      </p:sp>
+      <p:sp>
+        <p:nvSpPr>
+          <p:cNvPr id="4" name="Rectangle 3">
+            <a:extLst>
+              <a:ext uri="{FF2B5EF4-FFF2-40B4-BE49-F238E27FC236}">
+                <a16:creationId xmlns:a16="http://schemas.microsoft.com/office/drawing/2014/main" id="{4546F2AB-C164-D643-A302-6050F3DA2B63}"/>
+              </a:ext>
+            </a:extLst>
+          </p:cNvPr>
+          <p:cNvSpPr/>
+          <p:nvPr/>
+        </p:nvSpPr>
+        <p:spPr>
+          <a:xfrm>
+            <a:off x="3991543" y="2559596"/>
+            <a:ext cx="1969273" cy="742198"/>
+          </a:xfrm>
+          <a:prstGeom prst="rect">
+            <a:avLst/>
+          </a:prstGeom>
+          <a:ln/>
+        </p:spPr>
+        <p:style>
+          <a:lnRef idx="2">
+            <a:schemeClr val="accent4"/>
+          </a:lnRef>
+          <a:fillRef idx="1">
+            <a:schemeClr val="lt1"/>
+          </a:fillRef>
+          <a:effectRef idx="0">
+            <a:schemeClr val="accent4"/>
+          </a:effectRef>
+          <a:fontRef idx="minor">
+            <a:schemeClr val="dk1"/>
+          </a:fontRef>
+        </p:style>
+        <p:txBody>
+          <a:bodyPr rtlCol="0" anchor="ctr"/>
+          <a:lstStyle/>
+          <a:p>
+            <a:pPr algn="ctr"/>
+            <a:endParaRPr lang="en-US"/>
+          </a:p>
+        </p:txBody>
+      </p:sp>
+      <p:sp>
+        <p:nvSpPr>
+          <p:cNvPr id="13" name="Snip and Round Single Corner Rectangle 12">
+            <a:extLst>
+              <a:ext uri="{FF2B5EF4-FFF2-40B4-BE49-F238E27FC236}">
+                <a16:creationId xmlns:a16="http://schemas.microsoft.com/office/drawing/2014/main" id="{05F38BEA-49B6-CF1D-3211-F59D0192BF04}"/>
+              </a:ext>
+            </a:extLst>
+          </p:cNvPr>
+          <p:cNvSpPr/>
+          <p:nvPr/>
+        </p:nvSpPr>
+        <p:spPr>
+          <a:xfrm>
+            <a:off x="3466248" y="610869"/>
+            <a:ext cx="214686" cy="166978"/>
+          </a:xfrm>
+          <a:prstGeom prst="snipRoundRect">
+            <a:avLst/>
+          </a:prstGeom>
+        </p:spPr>
+        <p:style>
+          <a:lnRef idx="2">
+            <a:schemeClr val="accent4"/>
+          </a:lnRef>
+          <a:fillRef idx="1">
+            <a:schemeClr val="lt1"/>
+          </a:fillRef>
+          <a:effectRef idx="0">
+            <a:schemeClr val="accent4"/>
+          </a:effectRef>
+          <a:fontRef idx="minor">
+            <a:schemeClr val="dk1"/>
+          </a:fontRef>
+        </p:style>
+        <p:txBody>
+          <a:bodyPr rtlCol="0" anchor="ctr"/>
+          <a:lstStyle/>
+          <a:p>
+            <a:pPr algn="ctr"/>
+            <a:r>
+              <a:rPr lang="en-US" sz="900" dirty="0"/>
+              <a:t>M</a:t>
+            </a:r>
+          </a:p>
+        </p:txBody>
+      </p:sp>
+      <p:sp>
+        <p:nvSpPr>
+          <p:cNvPr id="17" name="Rectangle 16">
+            <a:extLst>
+              <a:ext uri="{FF2B5EF4-FFF2-40B4-BE49-F238E27FC236}">
+                <a16:creationId xmlns:a16="http://schemas.microsoft.com/office/drawing/2014/main" id="{B9116199-F1BE-9456-EECE-07B706913542}"/>
+              </a:ext>
+            </a:extLst>
+          </p:cNvPr>
+          <p:cNvSpPr/>
+          <p:nvPr/>
+        </p:nvSpPr>
+        <p:spPr>
+          <a:xfrm>
+            <a:off x="3991548" y="3736438"/>
+            <a:ext cx="1969273" cy="265353"/>
+          </a:xfrm>
+          <a:prstGeom prst="rect">
+            <a:avLst/>
+          </a:prstGeom>
+        </p:spPr>
+        <p:style>
+          <a:lnRef idx="2">
+            <a:schemeClr val="accent5"/>
+          </a:lnRef>
+          <a:fillRef idx="1">
+            <a:schemeClr val="lt1"/>
+          </a:fillRef>
+          <a:effectRef idx="0">
+            <a:schemeClr val="accent5"/>
+          </a:effectRef>
+          <a:fontRef idx="minor">
+            <a:schemeClr val="dk1"/>
+          </a:fontRef>
+        </p:style>
+        <p:txBody>
+          <a:bodyPr rtlCol="0" anchor="ctr"/>
+          <a:lstStyle/>
+          <a:p>
+            <a:pPr algn="ctr"/>
+            <a:endParaRPr lang="en-US"/>
+          </a:p>
+        </p:txBody>
+      </p:sp>
+      <p:sp>
+        <p:nvSpPr>
+          <p:cNvPr id="18" name="Rectangle 17">
+            <a:extLst>
+              <a:ext uri="{FF2B5EF4-FFF2-40B4-BE49-F238E27FC236}">
+                <a16:creationId xmlns:a16="http://schemas.microsoft.com/office/drawing/2014/main" id="{1C775D59-BD09-AFAE-3289-316E5A467D71}"/>
+              </a:ext>
+            </a:extLst>
+          </p:cNvPr>
+          <p:cNvSpPr/>
+          <p:nvPr/>
+        </p:nvSpPr>
+        <p:spPr>
+          <a:xfrm>
+            <a:off x="3991544" y="4048196"/>
+            <a:ext cx="1969273" cy="265353"/>
+          </a:xfrm>
+          <a:prstGeom prst="rect">
+            <a:avLst/>
+          </a:prstGeom>
+        </p:spPr>
+        <p:style>
+          <a:lnRef idx="2">
+            <a:schemeClr val="accent5"/>
+          </a:lnRef>
+          <a:fillRef idx="1">
+            <a:schemeClr val="lt1"/>
+          </a:fillRef>
+          <a:effectRef idx="0">
+            <a:schemeClr val="accent5"/>
+          </a:effectRef>
+          <a:fontRef idx="minor">
+            <a:schemeClr val="dk1"/>
+          </a:fontRef>
+        </p:style>
+        <p:txBody>
+          <a:bodyPr rtlCol="0" anchor="ctr"/>
+          <a:lstStyle/>
+          <a:p>
+            <a:pPr algn="ctr"/>
+            <a:endParaRPr lang="en-US"/>
+          </a:p>
+        </p:txBody>
+      </p:sp>
+      <p:sp>
+        <p:nvSpPr>
+          <p:cNvPr id="19" name="Rectangle 18">
+            <a:extLst>
+              <a:ext uri="{FF2B5EF4-FFF2-40B4-BE49-F238E27FC236}">
+                <a16:creationId xmlns:a16="http://schemas.microsoft.com/office/drawing/2014/main" id="{DFD8A470-74FE-4888-3FC8-BA77B24211DF}"/>
+              </a:ext>
+            </a:extLst>
+          </p:cNvPr>
+          <p:cNvSpPr/>
+          <p:nvPr/>
+        </p:nvSpPr>
+        <p:spPr>
+          <a:xfrm>
+            <a:off x="3991543" y="4576207"/>
+            <a:ext cx="1969273" cy="265353"/>
+          </a:xfrm>
+          <a:prstGeom prst="rect">
+            <a:avLst/>
+          </a:prstGeom>
+        </p:spPr>
+        <p:style>
+          <a:lnRef idx="2">
+            <a:schemeClr val="accent5"/>
+          </a:lnRef>
+          <a:fillRef idx="1">
+            <a:schemeClr val="lt1"/>
+          </a:fillRef>
+          <a:effectRef idx="0">
+            <a:schemeClr val="accent5"/>
+          </a:effectRef>
+          <a:fontRef idx="minor">
+            <a:schemeClr val="dk1"/>
+          </a:fontRef>
+        </p:style>
+        <p:txBody>
+          <a:bodyPr rtlCol="0" anchor="ctr"/>
+          <a:lstStyle/>
+          <a:p>
+            <a:pPr algn="ctr"/>
+            <a:endParaRPr lang="en-US"/>
+          </a:p>
+        </p:txBody>
+      </p:sp>
+      <p:sp>
+        <p:nvSpPr>
+          <p:cNvPr id="20" name="TextBox 19">
+            <a:extLst>
+              <a:ext uri="{FF2B5EF4-FFF2-40B4-BE49-F238E27FC236}">
+                <a16:creationId xmlns:a16="http://schemas.microsoft.com/office/drawing/2014/main" id="{6D556DB4-1F27-F88E-8477-3E2EC791EEB6}"/>
+              </a:ext>
+            </a:extLst>
+          </p:cNvPr>
+          <p:cNvSpPr txBox="1"/>
+          <p:nvPr/>
+        </p:nvSpPr>
+        <p:spPr>
+          <a:xfrm>
+            <a:off x="4822319" y="4175289"/>
+            <a:ext cx="552091" cy="369332"/>
+          </a:xfrm>
+          <a:prstGeom prst="rect">
+            <a:avLst/>
+          </a:prstGeom>
+          <a:noFill/>
+        </p:spPr>
+        <p:txBody>
+          <a:bodyPr wrap="square" rtlCol="0">
+            <a:spAutoFit/>
+          </a:bodyPr>
+          <a:lstStyle/>
+          <a:p>
+            <a:r>
+              <a:rPr lang="en-US" dirty="0"/>
+              <a:t>...</a:t>
+            </a:r>
+          </a:p>
+        </p:txBody>
+      </p:sp>
+      <p:sp>
+        <p:nvSpPr>
+          <p:cNvPr id="21" name="TextBox 20">
+            <a:extLst>
+              <a:ext uri="{FF2B5EF4-FFF2-40B4-BE49-F238E27FC236}">
+                <a16:creationId xmlns:a16="http://schemas.microsoft.com/office/drawing/2014/main" id="{15CA031E-04EA-EA16-EC77-E20FFADE7260}"/>
+              </a:ext>
+            </a:extLst>
+          </p:cNvPr>
+          <p:cNvSpPr txBox="1"/>
+          <p:nvPr/>
+        </p:nvSpPr>
+        <p:spPr>
+          <a:xfrm>
+            <a:off x="1419282" y="371193"/>
+            <a:ext cx="1314784" cy="646331"/>
+          </a:xfrm>
+          <a:prstGeom prst="rect">
+            <a:avLst/>
+          </a:prstGeom>
+          <a:noFill/>
+        </p:spPr>
+        <p:txBody>
+          <a:bodyPr wrap="none" rtlCol="0">
+            <a:spAutoFit/>
+          </a:bodyPr>
+          <a:lstStyle/>
+          <a:p>
+            <a:r>
+              <a:rPr lang="en-US" sz="1200" dirty="0">
+                <a:solidFill>
+                  <a:srgbClr val="00B050"/>
+                </a:solidFill>
+              </a:rPr>
+              <a:t>Project Bundle</a:t>
+            </a:r>
+          </a:p>
+          <a:p>
+            <a:pPr marL="171450" indent="-171450">
+              <a:buFontTx/>
+              <a:buChar char="-"/>
+            </a:pPr>
+            <a:r>
+              <a:rPr lang="en-US" sz="1200" dirty="0">
+                <a:solidFill>
+                  <a:srgbClr val="00B050"/>
+                </a:solidFill>
+              </a:rPr>
+              <a:t>1 per project</a:t>
+            </a:r>
+          </a:p>
+          <a:p>
+            <a:pPr marL="171450" indent="-171450">
+              <a:buFontTx/>
+              <a:buChar char="-"/>
+            </a:pPr>
+            <a:r>
+              <a:rPr lang="en-US" sz="1200" dirty="0">
+                <a:solidFill>
+                  <a:srgbClr val="00B050"/>
+                </a:solidFill>
+              </a:rPr>
+              <a:t>Versioned </a:t>
+            </a:r>
+          </a:p>
+        </p:txBody>
+      </p:sp>
+      <p:sp>
+        <p:nvSpPr>
+          <p:cNvPr id="22" name="TextBox 21">
+            <a:extLst>
+              <a:ext uri="{FF2B5EF4-FFF2-40B4-BE49-F238E27FC236}">
+                <a16:creationId xmlns:a16="http://schemas.microsoft.com/office/drawing/2014/main" id="{0CFB5C3A-E671-FBAB-F937-26D4BB71782A}"/>
+              </a:ext>
+            </a:extLst>
+          </p:cNvPr>
+          <p:cNvSpPr txBox="1"/>
+          <p:nvPr/>
+        </p:nvSpPr>
+        <p:spPr>
+          <a:xfrm>
+            <a:off x="267427" y="1365547"/>
+            <a:ext cx="2844048" cy="646331"/>
+          </a:xfrm>
+          <a:prstGeom prst="rect">
+            <a:avLst/>
+          </a:prstGeom>
+          <a:noFill/>
+        </p:spPr>
+        <p:txBody>
+          <a:bodyPr wrap="square" rtlCol="0">
+            <a:spAutoFit/>
+          </a:bodyPr>
+          <a:lstStyle/>
+          <a:p>
+            <a:r>
+              <a:rPr lang="en-US" sz="1200" dirty="0">
+                <a:solidFill>
+                  <a:schemeClr val="accent2">
+                    <a:lumMod val="75000"/>
+                  </a:schemeClr>
+                </a:solidFill>
+              </a:rPr>
+              <a:t>Meta Bundle</a:t>
+            </a:r>
+          </a:p>
+          <a:p>
+            <a:pPr marL="171450" indent="-171450">
+              <a:buFontTx/>
+              <a:buChar char="-"/>
+            </a:pPr>
+            <a:r>
+              <a:rPr lang="en-US" sz="1200" dirty="0">
+                <a:solidFill>
+                  <a:schemeClr val="accent2">
+                    <a:lumMod val="75000"/>
+                  </a:schemeClr>
+                </a:solidFill>
+              </a:rPr>
+              <a:t>1 per project bundle, root bundle</a:t>
+            </a:r>
+          </a:p>
+          <a:p>
+            <a:pPr marL="171450" indent="-171450">
+              <a:buFontTx/>
+              <a:buChar char="-"/>
+            </a:pPr>
+            <a:r>
+              <a:rPr lang="en-US" sz="1200" dirty="0">
+                <a:solidFill>
+                  <a:schemeClr val="accent2">
+                    <a:lumMod val="75000"/>
+                  </a:schemeClr>
+                </a:solidFill>
+              </a:rPr>
+              <a:t>Versioned </a:t>
+            </a:r>
+          </a:p>
+        </p:txBody>
+      </p:sp>
+      <p:sp>
+        <p:nvSpPr>
+          <p:cNvPr id="23" name="TextBox 22">
+            <a:extLst>
+              <a:ext uri="{FF2B5EF4-FFF2-40B4-BE49-F238E27FC236}">
+                <a16:creationId xmlns:a16="http://schemas.microsoft.com/office/drawing/2014/main" id="{3131D80A-57D0-C77F-CC8F-F10ED02FA3FA}"/>
+              </a:ext>
+            </a:extLst>
+          </p:cNvPr>
+          <p:cNvSpPr txBox="1"/>
+          <p:nvPr/>
+        </p:nvSpPr>
+        <p:spPr>
+          <a:xfrm>
+            <a:off x="267427" y="2359901"/>
+            <a:ext cx="2844048" cy="1200329"/>
+          </a:xfrm>
+          <a:prstGeom prst="rect">
+            <a:avLst/>
+          </a:prstGeom>
+          <a:noFill/>
+        </p:spPr>
+        <p:txBody>
+          <a:bodyPr wrap="square" rtlCol="0">
+            <a:spAutoFit/>
+          </a:bodyPr>
+          <a:lstStyle/>
+          <a:p>
+            <a:r>
+              <a:rPr lang="en-US" sz="1200" dirty="0">
+                <a:solidFill>
+                  <a:srgbClr val="0070C0"/>
+                </a:solidFill>
+              </a:rPr>
+              <a:t>Standards Bundle</a:t>
+            </a:r>
+          </a:p>
+          <a:p>
+            <a:pPr marL="171450" indent="-171450">
+              <a:buFontTx/>
+              <a:buChar char="-"/>
+            </a:pPr>
+            <a:r>
+              <a:rPr lang="en-US" sz="1200" dirty="0">
+                <a:solidFill>
+                  <a:srgbClr val="0070C0"/>
+                </a:solidFill>
+              </a:rPr>
+              <a:t>1 per project bundle, root bundle</a:t>
+            </a:r>
+          </a:p>
+          <a:p>
+            <a:pPr marL="171450" indent="-171450">
+              <a:buFontTx/>
+              <a:buChar char="-"/>
+            </a:pPr>
+            <a:r>
+              <a:rPr lang="en-US" sz="1200" dirty="0">
+                <a:solidFill>
+                  <a:srgbClr val="0070C0"/>
+                </a:solidFill>
+              </a:rPr>
+              <a:t>May contain other bundles (HIPAA or SOC2) or SCDs (corporate standards)</a:t>
+            </a:r>
+          </a:p>
+          <a:p>
+            <a:pPr marL="171450" indent="-171450">
+              <a:buFontTx/>
+              <a:buChar char="-"/>
+            </a:pPr>
+            <a:r>
+              <a:rPr lang="en-US" sz="1200" dirty="0">
+                <a:solidFill>
+                  <a:srgbClr val="0070C0"/>
+                </a:solidFill>
+              </a:rPr>
+              <a:t>Versioned </a:t>
+            </a:r>
+          </a:p>
+        </p:txBody>
+      </p:sp>
+      <p:sp>
+        <p:nvSpPr>
+          <p:cNvPr id="24" name="TextBox 23">
+            <a:extLst>
+              <a:ext uri="{FF2B5EF4-FFF2-40B4-BE49-F238E27FC236}">
+                <a16:creationId xmlns:a16="http://schemas.microsoft.com/office/drawing/2014/main" id="{5929B3FA-8D0D-1F6E-72EA-644B6A1B855F}"/>
+              </a:ext>
+            </a:extLst>
+          </p:cNvPr>
+          <p:cNvSpPr txBox="1"/>
+          <p:nvPr/>
+        </p:nvSpPr>
+        <p:spPr>
+          <a:xfrm>
+            <a:off x="267427" y="3871988"/>
+            <a:ext cx="2515307" cy="1384995"/>
+          </a:xfrm>
+          <a:prstGeom prst="rect">
+            <a:avLst/>
+          </a:prstGeom>
+          <a:noFill/>
+        </p:spPr>
+        <p:txBody>
+          <a:bodyPr wrap="square" rtlCol="0">
+            <a:spAutoFit/>
+          </a:bodyPr>
+          <a:lstStyle/>
+          <a:p>
+            <a:r>
+              <a:rPr lang="en-US" sz="1200" dirty="0">
+                <a:solidFill>
+                  <a:srgbClr val="7030A0"/>
+                </a:solidFill>
+              </a:rPr>
+              <a:t>Domain Bundles</a:t>
+            </a:r>
+          </a:p>
+          <a:p>
+            <a:pPr marL="171450" indent="-171450">
+              <a:buFontTx/>
+              <a:buChar char="-"/>
+            </a:pPr>
+            <a:r>
+              <a:rPr lang="en-US" sz="1200" dirty="0">
+                <a:solidFill>
+                  <a:srgbClr val="7030A0"/>
+                </a:solidFill>
+              </a:rPr>
+              <a:t>10 core bundles, no duplicates</a:t>
+            </a:r>
+          </a:p>
+          <a:p>
+            <a:pPr marL="171450" indent="-171450">
+              <a:buFontTx/>
+              <a:buChar char="-"/>
+            </a:pPr>
+            <a:r>
+              <a:rPr lang="en-US" sz="1200" dirty="0">
+                <a:solidFill>
+                  <a:srgbClr val="7030A0"/>
+                </a:solidFill>
+              </a:rPr>
+              <a:t>Contains only SCDs</a:t>
+            </a:r>
+          </a:p>
+          <a:p>
+            <a:pPr marL="171450" indent="-171450">
+              <a:buFontTx/>
+              <a:buChar char="-"/>
+            </a:pPr>
+            <a:r>
+              <a:rPr lang="en-US" sz="1200" dirty="0">
+                <a:solidFill>
+                  <a:srgbClr val="7030A0"/>
+                </a:solidFill>
+              </a:rPr>
+              <a:t>Customer may add more but the 10 core are the minimum prescribed set.</a:t>
+            </a:r>
+          </a:p>
+        </p:txBody>
+      </p:sp>
+      <p:sp>
+        <p:nvSpPr>
+          <p:cNvPr id="25" name="Snip and Round Single Corner Rectangle 24">
+            <a:extLst>
+              <a:ext uri="{FF2B5EF4-FFF2-40B4-BE49-F238E27FC236}">
+                <a16:creationId xmlns:a16="http://schemas.microsoft.com/office/drawing/2014/main" id="{96EDE83A-53A8-033F-8FF3-49BCA416B094}"/>
+              </a:ext>
+            </a:extLst>
+          </p:cNvPr>
+          <p:cNvSpPr/>
+          <p:nvPr/>
+        </p:nvSpPr>
+        <p:spPr>
+          <a:xfrm>
+            <a:off x="4058595" y="1532619"/>
+            <a:ext cx="214686" cy="166978"/>
+          </a:xfrm>
+          <a:prstGeom prst="snipRoundRect">
+            <a:avLst/>
+          </a:prstGeom>
+        </p:spPr>
+        <p:style>
+          <a:lnRef idx="2">
+            <a:schemeClr val="accent4"/>
+          </a:lnRef>
+          <a:fillRef idx="1">
+            <a:schemeClr val="lt1"/>
+          </a:fillRef>
+          <a:effectRef idx="0">
+            <a:schemeClr val="accent4"/>
+          </a:effectRef>
+          <a:fontRef idx="minor">
+            <a:schemeClr val="dk1"/>
+          </a:fontRef>
+        </p:style>
+        <p:txBody>
+          <a:bodyPr rtlCol="0" anchor="ctr"/>
+          <a:lstStyle/>
+          <a:p>
+            <a:pPr algn="ctr"/>
+            <a:r>
+              <a:rPr lang="en-US" sz="900" dirty="0"/>
+              <a:t>M</a:t>
+            </a:r>
+          </a:p>
+        </p:txBody>
+      </p:sp>
+      <p:sp>
+        <p:nvSpPr>
+          <p:cNvPr id="26" name="Snip and Round Single Corner Rectangle 25">
+            <a:extLst>
+              <a:ext uri="{FF2B5EF4-FFF2-40B4-BE49-F238E27FC236}">
+                <a16:creationId xmlns:a16="http://schemas.microsoft.com/office/drawing/2014/main" id="{040ED393-4AA3-09D7-3F60-3756270A6928}"/>
+              </a:ext>
+            </a:extLst>
+          </p:cNvPr>
+          <p:cNvSpPr/>
+          <p:nvPr/>
+        </p:nvSpPr>
+        <p:spPr>
+          <a:xfrm>
+            <a:off x="4058595" y="2625972"/>
+            <a:ext cx="214686" cy="166978"/>
+          </a:xfrm>
+          <a:prstGeom prst="snipRoundRect">
+            <a:avLst/>
+          </a:prstGeom>
+        </p:spPr>
+        <p:style>
+          <a:lnRef idx="2">
+            <a:schemeClr val="accent4"/>
+          </a:lnRef>
+          <a:fillRef idx="1">
+            <a:schemeClr val="lt1"/>
+          </a:fillRef>
+          <a:effectRef idx="0">
+            <a:schemeClr val="accent4"/>
+          </a:effectRef>
+          <a:fontRef idx="minor">
+            <a:schemeClr val="dk1"/>
+          </a:fontRef>
+        </p:style>
+        <p:txBody>
+          <a:bodyPr rtlCol="0" anchor="ctr"/>
+          <a:lstStyle/>
+          <a:p>
+            <a:pPr algn="ctr"/>
+            <a:r>
+              <a:rPr lang="en-US" sz="900" dirty="0"/>
+              <a:t>M</a:t>
+            </a:r>
+          </a:p>
+        </p:txBody>
+      </p:sp>
+      <p:sp>
+        <p:nvSpPr>
+          <p:cNvPr id="27" name="Snip and Round Single Corner Rectangle 26">
+            <a:extLst>
+              <a:ext uri="{FF2B5EF4-FFF2-40B4-BE49-F238E27FC236}">
+                <a16:creationId xmlns:a16="http://schemas.microsoft.com/office/drawing/2014/main" id="{B6D3F936-8F3C-633D-1F8B-3DC789746844}"/>
+              </a:ext>
+            </a:extLst>
+          </p:cNvPr>
+          <p:cNvSpPr/>
+          <p:nvPr/>
+        </p:nvSpPr>
+        <p:spPr>
+          <a:xfrm>
+            <a:off x="4048331" y="3792721"/>
+            <a:ext cx="214686" cy="166978"/>
+          </a:xfrm>
+          <a:prstGeom prst="snipRoundRect">
+            <a:avLst/>
+          </a:prstGeom>
+        </p:spPr>
+        <p:style>
+          <a:lnRef idx="2">
+            <a:schemeClr val="accent4"/>
+          </a:lnRef>
+          <a:fillRef idx="1">
+            <a:schemeClr val="lt1"/>
+          </a:fillRef>
+          <a:effectRef idx="0">
+            <a:schemeClr val="accent4"/>
+          </a:effectRef>
+          <a:fontRef idx="minor">
+            <a:schemeClr val="dk1"/>
+          </a:fontRef>
+        </p:style>
+        <p:txBody>
+          <a:bodyPr rtlCol="0" anchor="ctr"/>
+          <a:lstStyle/>
+          <a:p>
+            <a:pPr algn="ctr"/>
+            <a:r>
+              <a:rPr lang="en-US" sz="900" dirty="0"/>
+              <a:t>M</a:t>
+            </a:r>
+          </a:p>
+        </p:txBody>
+      </p:sp>
+      <p:sp>
+        <p:nvSpPr>
+          <p:cNvPr id="28" name="Snip and Round Single Corner Rectangle 27">
+            <a:extLst>
+              <a:ext uri="{FF2B5EF4-FFF2-40B4-BE49-F238E27FC236}">
+                <a16:creationId xmlns:a16="http://schemas.microsoft.com/office/drawing/2014/main" id="{3703A1D0-11F7-9839-F6C3-0F0D8BD5B763}"/>
+              </a:ext>
+            </a:extLst>
+          </p:cNvPr>
+          <p:cNvSpPr/>
+          <p:nvPr/>
+        </p:nvSpPr>
+        <p:spPr>
+          <a:xfrm>
+            <a:off x="4048331" y="4104554"/>
+            <a:ext cx="214686" cy="166978"/>
+          </a:xfrm>
+          <a:prstGeom prst="snipRoundRect">
+            <a:avLst/>
+          </a:prstGeom>
+        </p:spPr>
+        <p:style>
+          <a:lnRef idx="2">
+            <a:schemeClr val="accent4"/>
+          </a:lnRef>
+          <a:fillRef idx="1">
+            <a:schemeClr val="lt1"/>
+          </a:fillRef>
+          <a:effectRef idx="0">
+            <a:schemeClr val="accent4"/>
+          </a:effectRef>
+          <a:fontRef idx="minor">
+            <a:schemeClr val="dk1"/>
+          </a:fontRef>
+        </p:style>
+        <p:txBody>
+          <a:bodyPr rtlCol="0" anchor="ctr"/>
+          <a:lstStyle/>
+          <a:p>
+            <a:pPr algn="ctr"/>
+            <a:r>
+              <a:rPr lang="en-US" sz="900" dirty="0"/>
+              <a:t>M</a:t>
+            </a:r>
+          </a:p>
+        </p:txBody>
+      </p:sp>
+      <p:sp>
+        <p:nvSpPr>
+          <p:cNvPr id="29" name="Snip and Round Single Corner Rectangle 28">
+            <a:extLst>
+              <a:ext uri="{FF2B5EF4-FFF2-40B4-BE49-F238E27FC236}">
+                <a16:creationId xmlns:a16="http://schemas.microsoft.com/office/drawing/2014/main" id="{9141949A-7E5B-F96F-D4C4-8F966AD831C5}"/>
+              </a:ext>
+            </a:extLst>
+          </p:cNvPr>
+          <p:cNvSpPr/>
+          <p:nvPr/>
+        </p:nvSpPr>
+        <p:spPr>
+          <a:xfrm>
+            <a:off x="4058595" y="4617726"/>
+            <a:ext cx="214686" cy="166978"/>
+          </a:xfrm>
+          <a:prstGeom prst="snipRoundRect">
+            <a:avLst/>
+          </a:prstGeom>
+        </p:spPr>
+        <p:style>
+          <a:lnRef idx="2">
+            <a:schemeClr val="accent4"/>
+          </a:lnRef>
+          <a:fillRef idx="1">
+            <a:schemeClr val="lt1"/>
+          </a:fillRef>
+          <a:effectRef idx="0">
+            <a:schemeClr val="accent4"/>
+          </a:effectRef>
+          <a:fontRef idx="minor">
+            <a:schemeClr val="dk1"/>
+          </a:fontRef>
+        </p:style>
+        <p:txBody>
+          <a:bodyPr rtlCol="0" anchor="ctr"/>
+          <a:lstStyle/>
+          <a:p>
+            <a:pPr algn="ctr"/>
+            <a:r>
+              <a:rPr lang="en-US" sz="900" dirty="0"/>
+              <a:t>M</a:t>
+            </a:r>
+          </a:p>
+        </p:txBody>
+      </p:sp>
+      <p:sp>
+        <p:nvSpPr>
+          <p:cNvPr id="30" name="TextBox 29">
+            <a:extLst>
+              <a:ext uri="{FF2B5EF4-FFF2-40B4-BE49-F238E27FC236}">
+                <a16:creationId xmlns:a16="http://schemas.microsoft.com/office/drawing/2014/main" id="{6B9E8D85-47FA-B91B-0696-C1AC68E40BD1}"/>
+              </a:ext>
+            </a:extLst>
+          </p:cNvPr>
+          <p:cNvSpPr txBox="1"/>
+          <p:nvPr/>
+        </p:nvSpPr>
+        <p:spPr>
+          <a:xfrm>
+            <a:off x="7522232" y="1263820"/>
+            <a:ext cx="3899141" cy="2862322"/>
+          </a:xfrm>
+          <a:prstGeom prst="rect">
+            <a:avLst/>
+          </a:prstGeom>
+          <a:noFill/>
+        </p:spPr>
+        <p:txBody>
+          <a:bodyPr wrap="square" rtlCol="0">
+            <a:spAutoFit/>
+          </a:bodyPr>
+          <a:lstStyle/>
+          <a:p>
+            <a:r>
+              <a:rPr lang="en-US" sz="1200" dirty="0"/>
+              <a:t>Each bundle must contain a Manifest</a:t>
+            </a:r>
+          </a:p>
+          <a:p>
+            <a:endParaRPr lang="en-US" sz="1200" dirty="0"/>
+          </a:p>
+          <a:p>
+            <a:r>
+              <a:rPr lang="en-US" sz="1200" dirty="0"/>
+              <a:t>Manifest is a special SCD with a header and lists all content (and versions of each document)</a:t>
+            </a:r>
+          </a:p>
+          <a:p>
+            <a:endParaRPr lang="en-US" sz="1200" dirty="0"/>
+          </a:p>
+          <a:p>
+            <a:r>
+              <a:rPr lang="en-US" sz="1200" dirty="0"/>
+              <a:t>4 types of bundles:</a:t>
+            </a:r>
+          </a:p>
+          <a:p>
+            <a:pPr marL="171450" indent="-171450">
+              <a:buFontTx/>
+              <a:buChar char="-"/>
+            </a:pPr>
+            <a:r>
+              <a:rPr lang="en-US" sz="1200" dirty="0"/>
+              <a:t>Project</a:t>
+            </a:r>
+          </a:p>
+          <a:p>
+            <a:pPr marL="171450" indent="-171450">
+              <a:buFontTx/>
+              <a:buChar char="-"/>
+            </a:pPr>
+            <a:r>
+              <a:rPr lang="en-US" sz="1200" dirty="0"/>
+              <a:t>Meta</a:t>
+            </a:r>
+          </a:p>
+          <a:p>
+            <a:pPr marL="171450" indent="-171450">
+              <a:buFontTx/>
+              <a:buChar char="-"/>
+            </a:pPr>
+            <a:r>
+              <a:rPr lang="en-US" sz="1200" dirty="0"/>
+              <a:t>Standards</a:t>
+            </a:r>
+          </a:p>
+          <a:p>
+            <a:pPr marL="171450" indent="-171450">
+              <a:buFontTx/>
+              <a:buChar char="-"/>
+            </a:pPr>
+            <a:r>
+              <a:rPr lang="en-US" sz="1200" dirty="0"/>
+              <a:t>Domain</a:t>
+            </a:r>
+          </a:p>
+          <a:p>
+            <a:endParaRPr lang="en-US" sz="1200" dirty="0"/>
+          </a:p>
+          <a:p>
+            <a:r>
+              <a:rPr lang="en-US" sz="1200" dirty="0"/>
+              <a:t>Each bundle must contain a manifest at least 2 SCDs</a:t>
+            </a:r>
+          </a:p>
+          <a:p>
+            <a:endParaRPr lang="en-US" sz="1200" dirty="0"/>
+          </a:p>
+          <a:p>
+            <a:r>
+              <a:rPr lang="en-US" sz="1200" dirty="0"/>
+              <a:t>All domains require a bundle (with manifest)</a:t>
+            </a:r>
+          </a:p>
+        </p:txBody>
+      </p:sp>
+      <p:sp>
+        <p:nvSpPr>
+          <p:cNvPr id="32" name="TextBox 31">
+            <a:extLst>
+              <a:ext uri="{FF2B5EF4-FFF2-40B4-BE49-F238E27FC236}">
+                <a16:creationId xmlns:a16="http://schemas.microsoft.com/office/drawing/2014/main" id="{C1950C4E-14CA-E484-450D-345B46BB534C}"/>
+              </a:ext>
+            </a:extLst>
+          </p:cNvPr>
+          <p:cNvSpPr txBox="1"/>
+          <p:nvPr/>
+        </p:nvSpPr>
+        <p:spPr>
+          <a:xfrm>
+            <a:off x="4616193" y="3739611"/>
+            <a:ext cx="774571" cy="276999"/>
+          </a:xfrm>
+          <a:prstGeom prst="rect">
+            <a:avLst/>
+          </a:prstGeom>
+          <a:noFill/>
+        </p:spPr>
+        <p:txBody>
+          <a:bodyPr wrap="none" rtlCol="0">
+            <a:spAutoFit/>
+          </a:bodyPr>
+          <a:lstStyle/>
+          <a:p>
+            <a:r>
+              <a:rPr lang="en-US" sz="1200" dirty="0"/>
+              <a:t>Domain</a:t>
+            </a:r>
+          </a:p>
+        </p:txBody>
+      </p:sp>
+      <p:sp>
+        <p:nvSpPr>
+          <p:cNvPr id="33" name="TextBox 32">
+            <a:extLst>
+              <a:ext uri="{FF2B5EF4-FFF2-40B4-BE49-F238E27FC236}">
+                <a16:creationId xmlns:a16="http://schemas.microsoft.com/office/drawing/2014/main" id="{E0AF19D5-3C48-92DD-C2D3-8DA786D75923}"/>
+              </a:ext>
+            </a:extLst>
+          </p:cNvPr>
+          <p:cNvSpPr txBox="1"/>
+          <p:nvPr/>
+        </p:nvSpPr>
+        <p:spPr>
+          <a:xfrm>
+            <a:off x="4534440" y="2821565"/>
+            <a:ext cx="938077" cy="276999"/>
+          </a:xfrm>
+          <a:prstGeom prst="rect">
+            <a:avLst/>
+          </a:prstGeom>
+          <a:noFill/>
+        </p:spPr>
+        <p:txBody>
+          <a:bodyPr wrap="none" rtlCol="0">
+            <a:spAutoFit/>
+          </a:bodyPr>
+          <a:lstStyle/>
+          <a:p>
+            <a:r>
+              <a:rPr lang="en-US" sz="1200" dirty="0"/>
+              <a:t>Standards</a:t>
+            </a:r>
+          </a:p>
+        </p:txBody>
+      </p:sp>
+      <p:sp>
+        <p:nvSpPr>
+          <p:cNvPr id="34" name="TextBox 33">
+            <a:extLst>
+              <a:ext uri="{FF2B5EF4-FFF2-40B4-BE49-F238E27FC236}">
+                <a16:creationId xmlns:a16="http://schemas.microsoft.com/office/drawing/2014/main" id="{79EE547D-F5CB-5947-328A-0EC7DC83A337}"/>
+              </a:ext>
+            </a:extLst>
+          </p:cNvPr>
+          <p:cNvSpPr txBox="1"/>
+          <p:nvPr/>
+        </p:nvSpPr>
+        <p:spPr>
+          <a:xfrm>
+            <a:off x="4711571" y="1606570"/>
+            <a:ext cx="583814" cy="276999"/>
+          </a:xfrm>
+          <a:prstGeom prst="rect">
+            <a:avLst/>
+          </a:prstGeom>
+          <a:noFill/>
+        </p:spPr>
+        <p:txBody>
+          <a:bodyPr wrap="none" rtlCol="0">
+            <a:spAutoFit/>
+          </a:bodyPr>
+          <a:lstStyle/>
+          <a:p>
+            <a:r>
+              <a:rPr lang="en-US" sz="1200" dirty="0"/>
+              <a:t>Meta</a:t>
+            </a:r>
+          </a:p>
+        </p:txBody>
+      </p:sp>
+      <p:sp>
+        <p:nvSpPr>
+          <p:cNvPr id="35" name="TextBox 34">
+            <a:extLst>
+              <a:ext uri="{FF2B5EF4-FFF2-40B4-BE49-F238E27FC236}">
+                <a16:creationId xmlns:a16="http://schemas.microsoft.com/office/drawing/2014/main" id="{8C1AC6AF-6648-C6D5-6C58-E81025D81D33}"/>
+              </a:ext>
+            </a:extLst>
+          </p:cNvPr>
+          <p:cNvSpPr txBox="1"/>
+          <p:nvPr/>
+        </p:nvSpPr>
+        <p:spPr>
+          <a:xfrm>
+            <a:off x="4616193" y="4068136"/>
+            <a:ext cx="774571" cy="276999"/>
+          </a:xfrm>
+          <a:prstGeom prst="rect">
+            <a:avLst/>
+          </a:prstGeom>
+          <a:noFill/>
+        </p:spPr>
+        <p:txBody>
+          <a:bodyPr wrap="none" rtlCol="0">
+            <a:spAutoFit/>
+          </a:bodyPr>
+          <a:lstStyle/>
+          <a:p>
+            <a:r>
+              <a:rPr lang="en-US" sz="1200" dirty="0"/>
+              <a:t>Domain</a:t>
+            </a:r>
+          </a:p>
+        </p:txBody>
+      </p:sp>
+      <p:sp>
+        <p:nvSpPr>
+          <p:cNvPr id="36" name="TextBox 35">
+            <a:extLst>
+              <a:ext uri="{FF2B5EF4-FFF2-40B4-BE49-F238E27FC236}">
+                <a16:creationId xmlns:a16="http://schemas.microsoft.com/office/drawing/2014/main" id="{549DC5B6-6914-0C5D-E7A6-CD3F319317C2}"/>
+              </a:ext>
+            </a:extLst>
+          </p:cNvPr>
+          <p:cNvSpPr txBox="1"/>
+          <p:nvPr/>
+        </p:nvSpPr>
+        <p:spPr>
+          <a:xfrm>
+            <a:off x="4616193" y="4576207"/>
+            <a:ext cx="774571" cy="276999"/>
+          </a:xfrm>
+          <a:prstGeom prst="rect">
+            <a:avLst/>
+          </a:prstGeom>
+          <a:noFill/>
+        </p:spPr>
+        <p:txBody>
+          <a:bodyPr wrap="none" rtlCol="0">
+            <a:spAutoFit/>
+          </a:bodyPr>
+          <a:lstStyle/>
+          <a:p>
+            <a:r>
+              <a:rPr lang="en-US" sz="1200" dirty="0"/>
+              <a:t>Domain</a:t>
+            </a:r>
+          </a:p>
+        </p:txBody>
+      </p:sp>
+      <p:cxnSp>
+        <p:nvCxnSpPr>
+          <p:cNvPr id="38" name="Straight Arrow Connector 37">
+            <a:extLst>
+              <a:ext uri="{FF2B5EF4-FFF2-40B4-BE49-F238E27FC236}">
+                <a16:creationId xmlns:a16="http://schemas.microsoft.com/office/drawing/2014/main" id="{B8329EC6-36FF-759C-0922-44CC3FA5F21E}"/>
+              </a:ext>
+            </a:extLst>
+          </p:cNvPr>
+          <p:cNvCxnSpPr/>
+          <p:nvPr/>
+        </p:nvCxnSpPr>
+        <p:spPr>
+          <a:xfrm>
+            <a:off x="2782734" y="715992"/>
+            <a:ext cx="548863" cy="0"/>
+          </a:xfrm>
+          <a:prstGeom prst="straightConnector1">
+            <a:avLst/>
+          </a:prstGeom>
+          <a:ln>
+            <a:tailEnd type="triangle"/>
+          </a:ln>
+        </p:spPr>
+        <p:style>
+          <a:lnRef idx="3">
+            <a:schemeClr val="accent3"/>
+          </a:lnRef>
+          <a:fillRef idx="0">
+            <a:schemeClr val="accent3"/>
+          </a:fillRef>
+          <a:effectRef idx="2">
+            <a:schemeClr val="accent3"/>
+          </a:effectRef>
+          <a:fontRef idx="minor">
+            <a:schemeClr val="tx1"/>
+          </a:fontRef>
+        </p:style>
+      </p:cxnSp>
+      <p:cxnSp>
+        <p:nvCxnSpPr>
+          <p:cNvPr id="40" name="Straight Arrow Connector 39">
+            <a:extLst>
+              <a:ext uri="{FF2B5EF4-FFF2-40B4-BE49-F238E27FC236}">
+                <a16:creationId xmlns:a16="http://schemas.microsoft.com/office/drawing/2014/main" id="{D839CD2A-F994-A924-E722-C70A55EF0084}"/>
+              </a:ext>
+            </a:extLst>
+          </p:cNvPr>
+          <p:cNvCxnSpPr>
+            <a:stCxn id="22" idx="3"/>
+          </p:cNvCxnSpPr>
+          <p:nvPr/>
+        </p:nvCxnSpPr>
+        <p:spPr>
+          <a:xfrm>
+            <a:off x="3111475" y="1688713"/>
+            <a:ext cx="880068" cy="10884"/>
+          </a:xfrm>
+          <a:prstGeom prst="straightConnector1">
+            <a:avLst/>
+          </a:prstGeom>
+          <a:ln>
+            <a:tailEnd type="triangle"/>
+          </a:ln>
+        </p:spPr>
+        <p:style>
+          <a:lnRef idx="3">
+            <a:schemeClr val="accent2"/>
+          </a:lnRef>
+          <a:fillRef idx="0">
+            <a:schemeClr val="accent2"/>
+          </a:fillRef>
+          <a:effectRef idx="2">
+            <a:schemeClr val="accent2"/>
+          </a:effectRef>
+          <a:fontRef idx="minor">
+            <a:schemeClr val="tx1"/>
+          </a:fontRef>
+        </p:style>
+      </p:cxnSp>
+      <p:cxnSp>
+        <p:nvCxnSpPr>
+          <p:cNvPr id="42" name="Straight Arrow Connector 41">
+            <a:extLst>
+              <a:ext uri="{FF2B5EF4-FFF2-40B4-BE49-F238E27FC236}">
+                <a16:creationId xmlns:a16="http://schemas.microsoft.com/office/drawing/2014/main" id="{E9A3FAEA-499A-4595-F168-4149EB255F9F}"/>
+              </a:ext>
+            </a:extLst>
+          </p:cNvPr>
+          <p:cNvCxnSpPr/>
+          <p:nvPr/>
+        </p:nvCxnSpPr>
+        <p:spPr>
+          <a:xfrm>
+            <a:off x="3183147" y="2958860"/>
+            <a:ext cx="808396" cy="0"/>
+          </a:xfrm>
+          <a:prstGeom prst="straightConnector1">
+            <a:avLst/>
+          </a:prstGeom>
+          <a:ln>
+            <a:tailEnd type="triangle"/>
+          </a:ln>
+        </p:spPr>
+        <p:style>
+          <a:lnRef idx="3">
+            <a:schemeClr val="accent4"/>
+          </a:lnRef>
+          <a:fillRef idx="0">
+            <a:schemeClr val="accent4"/>
+          </a:fillRef>
+          <a:effectRef idx="2">
+            <a:schemeClr val="accent4"/>
+          </a:effectRef>
+          <a:fontRef idx="minor">
+            <a:schemeClr val="tx1"/>
+          </a:fontRef>
+        </p:style>
+      </p:cxnSp>
+      <p:sp>
+        <p:nvSpPr>
+          <p:cNvPr id="44" name="Left Brace 43">
+            <a:extLst>
+              <a:ext uri="{FF2B5EF4-FFF2-40B4-BE49-F238E27FC236}">
+                <a16:creationId xmlns:a16="http://schemas.microsoft.com/office/drawing/2014/main" id="{38A862B0-41BA-F780-10DB-9C291852A737}"/>
+              </a:ext>
+            </a:extLst>
+          </p:cNvPr>
+          <p:cNvSpPr/>
+          <p:nvPr/>
+        </p:nvSpPr>
+        <p:spPr>
+          <a:xfrm>
+            <a:off x="3579962" y="3614470"/>
+            <a:ext cx="229198" cy="1319842"/>
+          </a:xfrm>
+          <a:prstGeom prst="leftBrace">
+            <a:avLst/>
+          </a:prstGeom>
+        </p:spPr>
+        <p:style>
+          <a:lnRef idx="3">
+            <a:schemeClr val="accent5"/>
+          </a:lnRef>
+          <a:fillRef idx="0">
+            <a:schemeClr val="accent5"/>
+          </a:fillRef>
+          <a:effectRef idx="2">
+            <a:schemeClr val="accent5"/>
+          </a:effectRef>
+          <a:fontRef idx="minor">
+            <a:schemeClr val="tx1"/>
+          </a:fontRef>
+        </p:style>
+        <p:txBody>
+          <a:bodyPr rtlCol="0" anchor="ctr"/>
+          <a:lstStyle/>
+          <a:p>
+            <a:pPr algn="ctr"/>
+            <a:endParaRPr lang="en-US"/>
+          </a:p>
+        </p:txBody>
+      </p:sp>
+      <p:cxnSp>
+        <p:nvCxnSpPr>
+          <p:cNvPr id="46" name="Straight Arrow Connector 45">
+            <a:extLst>
+              <a:ext uri="{FF2B5EF4-FFF2-40B4-BE49-F238E27FC236}">
+                <a16:creationId xmlns:a16="http://schemas.microsoft.com/office/drawing/2014/main" id="{3138F270-2574-F2D4-6589-7FA03A529E32}"/>
+              </a:ext>
+            </a:extLst>
+          </p:cNvPr>
+          <p:cNvCxnSpPr/>
+          <p:nvPr/>
+        </p:nvCxnSpPr>
+        <p:spPr>
+          <a:xfrm>
+            <a:off x="2510287" y="4271532"/>
+            <a:ext cx="955961" cy="0"/>
+          </a:xfrm>
+          <a:prstGeom prst="straightConnector1">
+            <a:avLst/>
+          </a:prstGeom>
+          <a:ln>
+            <a:tailEnd type="triangle"/>
+          </a:ln>
+        </p:spPr>
+        <p:style>
+          <a:lnRef idx="3">
+            <a:schemeClr val="accent5"/>
+          </a:lnRef>
+          <a:fillRef idx="0">
+            <a:schemeClr val="accent5"/>
+          </a:fillRef>
+          <a:effectRef idx="2">
+            <a:schemeClr val="accent5"/>
+          </a:effectRef>
+          <a:fontRef idx="minor">
+            <a:schemeClr val="tx1"/>
+          </a:fontRef>
+        </p:style>
+      </p:cxnSp>
     </p:spTree>
     <p:extLst>
       <p:ext uri="{BB962C8B-B14F-4D97-AF65-F5344CB8AC3E}">
-        <p14:creationId xmlns:p14="http://schemas.microsoft.com/office/powerpoint/2010/main" val="479672462"/>
+        <p14:creationId xmlns:p14="http://schemas.microsoft.com/office/powerpoint/2010/main" val="2830470670"/>
       </p:ext>
     </p:extLst>
   </p:cSld>
@@ -4069,7 +5384,7 @@
           <p:cNvPr id="2" name="Title 1">
             <a:extLst>
               <a:ext uri="{FF2B5EF4-FFF2-40B4-BE49-F238E27FC236}">
-                <a16:creationId xmlns:a16="http://schemas.microsoft.com/office/drawing/2014/main" id="{4845427A-D290-A724-F108-47C85BD4B862}"/>
+                <a16:creationId xmlns:a16="http://schemas.microsoft.com/office/drawing/2014/main" id="{AFAE9414-A5E1-1614-2C74-C3CA2CFDD46C}"/>
               </a:ext>
             </a:extLst>
           </p:cNvPr>
@@ -4087,15 +5402,45 @@
           <a:p>
             <a:r>
               <a:rPr lang="en-US" dirty="0"/>
-              <a:t>SCDs for Standards</a:t>
-            </a:r>
-          </a:p>
-        </p:txBody>
-      </p:sp>
+              <a:t>SCDs for Projects</a:t>
+            </a:r>
+          </a:p>
+        </p:txBody>
+      </p:sp>
+      <p:pic>
+        <p:nvPicPr>
+          <p:cNvPr id="7" name="Picture 6">
+            <a:extLst>
+              <a:ext uri="{FF2B5EF4-FFF2-40B4-BE49-F238E27FC236}">
+                <a16:creationId xmlns:a16="http://schemas.microsoft.com/office/drawing/2014/main" id="{8A2DD0A5-3C6A-7994-69DD-C7F154267AF4}"/>
+              </a:ext>
+            </a:extLst>
+          </p:cNvPr>
+          <p:cNvPicPr>
+            <a:picLocks noChangeAspect="1"/>
+          </p:cNvPicPr>
+          <p:nvPr/>
+        </p:nvPicPr>
+        <p:blipFill>
+          <a:blip r:embed="rId2"/>
+          <a:stretch>
+            <a:fillRect/>
+          </a:stretch>
+        </p:blipFill>
+        <p:spPr>
+          <a:xfrm>
+            <a:off x="838200" y="1690688"/>
+            <a:ext cx="10320460" cy="4042665"/>
+          </a:xfrm>
+          <a:prstGeom prst="rect">
+            <a:avLst/>
+          </a:prstGeom>
+        </p:spPr>
+      </p:pic>
     </p:spTree>
     <p:extLst>
       <p:ext uri="{BB962C8B-B14F-4D97-AF65-F5344CB8AC3E}">
-        <p14:creationId xmlns:p14="http://schemas.microsoft.com/office/powerpoint/2010/main" val="2353492280"/>
+        <p14:creationId xmlns:p14="http://schemas.microsoft.com/office/powerpoint/2010/main" val="479672462"/>
       </p:ext>
     </p:extLst>
   </p:cSld>
@@ -4127,7 +5472,7 @@
           <p:cNvPr id="2" name="Title 1">
             <a:extLst>
               <a:ext uri="{FF2B5EF4-FFF2-40B4-BE49-F238E27FC236}">
-                <a16:creationId xmlns:a16="http://schemas.microsoft.com/office/drawing/2014/main" id="{B6C445BA-B015-906A-D6A2-BBE6237A97E9}"/>
+                <a16:creationId xmlns:a16="http://schemas.microsoft.com/office/drawing/2014/main" id="{4845427A-D290-A724-F108-47C85BD4B862}"/>
               </a:ext>
             </a:extLst>
           </p:cNvPr>
@@ -4145,35 +5490,7 @@
           <a:p>
             <a:r>
               <a:rPr lang="en-US" dirty="0"/>
-              <a:t>Deep Dive</a:t>
-            </a:r>
-          </a:p>
-        </p:txBody>
-      </p:sp>
-      <p:sp>
-        <p:nvSpPr>
-          <p:cNvPr id="3" name="Text Placeholder 2">
-            <a:extLst>
-              <a:ext uri="{FF2B5EF4-FFF2-40B4-BE49-F238E27FC236}">
-                <a16:creationId xmlns:a16="http://schemas.microsoft.com/office/drawing/2014/main" id="{9F152021-9F9C-2568-96D5-FDB4ACDA7DFB}"/>
-              </a:ext>
-            </a:extLst>
-          </p:cNvPr>
-          <p:cNvSpPr>
-            <a:spLocks noGrp="1"/>
-          </p:cNvSpPr>
-          <p:nvPr>
-            <p:ph type="body" idx="1"/>
-          </p:nvPr>
-        </p:nvSpPr>
-        <p:spPr/>
-        <p:txBody>
-          <a:bodyPr/>
-          <a:lstStyle/>
-          <a:p>
-            <a:r>
-              <a:rPr lang="en-US" dirty="0"/>
-              <a:t>PPT in process</a:t>
+              <a:t>SCDs for Standards</a:t>
             </a:r>
           </a:p>
         </p:txBody>
@@ -4181,7 +5498,7 @@
     </p:spTree>
     <p:extLst>
       <p:ext uri="{BB962C8B-B14F-4D97-AF65-F5344CB8AC3E}">
-        <p14:creationId xmlns:p14="http://schemas.microsoft.com/office/powerpoint/2010/main" val="4117839881"/>
+        <p14:creationId xmlns:p14="http://schemas.microsoft.com/office/powerpoint/2010/main" val="2353492280"/>
       </p:ext>
     </p:extLst>
   </p:cSld>
@@ -4213,7 +5530,7 @@
           <p:cNvPr id="2" name="Title 1">
             <a:extLst>
               <a:ext uri="{FF2B5EF4-FFF2-40B4-BE49-F238E27FC236}">
-                <a16:creationId xmlns:a16="http://schemas.microsoft.com/office/drawing/2014/main" id="{9807C173-8E45-FEC9-7B89-539C65793FAC}"/>
+                <a16:creationId xmlns:a16="http://schemas.microsoft.com/office/drawing/2014/main" id="{B6C445BA-B015-906A-D6A2-BBE6237A97E9}"/>
               </a:ext>
             </a:extLst>
           </p:cNvPr>
@@ -4231,14 +5548,7 @@
           <a:p>
             <a:r>
               <a:rPr lang="en-US" dirty="0"/>
-              <a:t>Case Study </a:t>
-            </a:r>
-            <a:br>
-              <a:rPr lang="en-US" dirty="0"/>
-            </a:br>
-            <a:r>
-              <a:rPr lang="en-US" sz="1800" dirty="0"/>
-              <a:t>(reference implementation)</a:t>
+              <a:t>Deep Dive</a:t>
             </a:r>
           </a:p>
         </p:txBody>
@@ -4248,7 +5558,7 @@
           <p:cNvPr id="3" name="Text Placeholder 2">
             <a:extLst>
               <a:ext uri="{FF2B5EF4-FFF2-40B4-BE49-F238E27FC236}">
-                <a16:creationId xmlns:a16="http://schemas.microsoft.com/office/drawing/2014/main" id="{DC077A1B-B348-470A-4138-CD9EBB450446}"/>
+                <a16:creationId xmlns:a16="http://schemas.microsoft.com/office/drawing/2014/main" id="{9F152021-9F9C-2568-96D5-FDB4ACDA7DFB}"/>
               </a:ext>
             </a:extLst>
           </p:cNvPr>
@@ -4274,7 +5584,7 @@
     </p:spTree>
     <p:extLst>
       <p:ext uri="{BB962C8B-B14F-4D97-AF65-F5344CB8AC3E}">
-        <p14:creationId xmlns:p14="http://schemas.microsoft.com/office/powerpoint/2010/main" val="453833099"/>
+        <p14:creationId xmlns:p14="http://schemas.microsoft.com/office/powerpoint/2010/main" val="4117839881"/>
       </p:ext>
     </p:extLst>
   </p:cSld>
@@ -4306,6 +5616,99 @@
           <p:cNvPr id="2" name="Title 1">
             <a:extLst>
               <a:ext uri="{FF2B5EF4-FFF2-40B4-BE49-F238E27FC236}">
+                <a16:creationId xmlns:a16="http://schemas.microsoft.com/office/drawing/2014/main" id="{9807C173-8E45-FEC9-7B89-539C65793FAC}"/>
+              </a:ext>
+            </a:extLst>
+          </p:cNvPr>
+          <p:cNvSpPr>
+            <a:spLocks noGrp="1"/>
+          </p:cNvSpPr>
+          <p:nvPr>
+            <p:ph type="title"/>
+          </p:nvPr>
+        </p:nvSpPr>
+        <p:spPr/>
+        <p:txBody>
+          <a:bodyPr/>
+          <a:lstStyle/>
+          <a:p>
+            <a:r>
+              <a:rPr lang="en-US" dirty="0"/>
+              <a:t>Case Study </a:t>
+            </a:r>
+            <a:br>
+              <a:rPr lang="en-US" dirty="0"/>
+            </a:br>
+            <a:r>
+              <a:rPr lang="en-US" sz="1800" dirty="0"/>
+              <a:t>(reference implementation)</a:t>
+            </a:r>
+          </a:p>
+        </p:txBody>
+      </p:sp>
+      <p:sp>
+        <p:nvSpPr>
+          <p:cNvPr id="3" name="Text Placeholder 2">
+            <a:extLst>
+              <a:ext uri="{FF2B5EF4-FFF2-40B4-BE49-F238E27FC236}">
+                <a16:creationId xmlns:a16="http://schemas.microsoft.com/office/drawing/2014/main" id="{DC077A1B-B348-470A-4138-CD9EBB450446}"/>
+              </a:ext>
+            </a:extLst>
+          </p:cNvPr>
+          <p:cNvSpPr>
+            <a:spLocks noGrp="1"/>
+          </p:cNvSpPr>
+          <p:nvPr>
+            <p:ph type="body" idx="1"/>
+          </p:nvPr>
+        </p:nvSpPr>
+        <p:spPr/>
+        <p:txBody>
+          <a:bodyPr/>
+          <a:lstStyle/>
+          <a:p>
+            <a:r>
+              <a:rPr lang="en-US" dirty="0"/>
+              <a:t>PPT in process</a:t>
+            </a:r>
+          </a:p>
+        </p:txBody>
+      </p:sp>
+    </p:spTree>
+    <p:extLst>
+      <p:ext uri="{BB962C8B-B14F-4D97-AF65-F5344CB8AC3E}">
+        <p14:creationId xmlns:p14="http://schemas.microsoft.com/office/powerpoint/2010/main" val="453833099"/>
+      </p:ext>
+    </p:extLst>
+  </p:cSld>
+  <p:clrMapOvr>
+    <a:masterClrMapping/>
+  </p:clrMapOvr>
+</p:sld>
+</file>
+
+<file path=ppt/slides/slide17.xml><?xml version="1.0" encoding="utf-8"?>
+<p:sld xmlns:a="http://schemas.openxmlformats.org/drawingml/2006/main" xmlns:r="http://schemas.openxmlformats.org/officeDocument/2006/relationships" xmlns:p="http://schemas.openxmlformats.org/presentationml/2006/main">
+  <p:cSld>
+    <p:spTree>
+      <p:nvGrpSpPr>
+        <p:cNvPr id="1" name=""/>
+        <p:cNvGrpSpPr/>
+        <p:nvPr/>
+      </p:nvGrpSpPr>
+      <p:grpSpPr>
+        <a:xfrm>
+          <a:off x="0" y="0"/>
+          <a:ext cx="0" cy="0"/>
+          <a:chOff x="0" y="0"/>
+          <a:chExt cx="0" cy="0"/>
+        </a:xfrm>
+      </p:grpSpPr>
+      <p:sp>
+        <p:nvSpPr>
+          <p:cNvPr id="2" name="Title 1">
+            <a:extLst>
+              <a:ext uri="{FF2B5EF4-FFF2-40B4-BE49-F238E27FC236}">
                 <a16:creationId xmlns:a16="http://schemas.microsoft.com/office/drawing/2014/main" id="{9F7A0FDF-41A8-EBE5-FE90-643D9ABF04A2}"/>
               </a:ext>
             </a:extLst>
@@ -4593,7 +5996,7 @@
 </p:sld>
 </file>
 
-<file path=ppt/slides/slide17.xml><?xml version="1.0" encoding="utf-8"?>
+<file path=ppt/slides/slide18.xml><?xml version="1.0" encoding="utf-8"?>
 <p:sld xmlns:a="http://schemas.openxmlformats.org/drawingml/2006/main" xmlns:r="http://schemas.openxmlformats.org/officeDocument/2006/relationships" xmlns:p="http://schemas.openxmlformats.org/presentationml/2006/main">
   <p:cSld>
     <p:spTree>
@@ -5227,7 +6630,7 @@
 </p:sld>
 </file>
 
-<file path=ppt/slides/slide18.xml><?xml version="1.0" encoding="utf-8"?>
+<file path=ppt/slides/slide19.xml><?xml version="1.0" encoding="utf-8"?>
 <p:sld xmlns:a="http://schemas.openxmlformats.org/drawingml/2006/main" xmlns:r="http://schemas.openxmlformats.org/officeDocument/2006/relationships" xmlns:p="http://schemas.openxmlformats.org/presentationml/2006/main">
   <p:cSld>
     <p:spTree>

</xml_diff>